<commit_message>
Rewrite HTA and STN
</commit_message>
<xml_diff>
--- a/Report/HTA.pptx
+++ b/Report/HTA.pptx
@@ -107,6 +107,11 @@
       </a:defRPr>
     </a:lvl9pPr>
   </p:defaultTextStyle>
+  <p:extLst>
+    <p:ext uri="{EFAFB233-063F-42B5-8137-9DF3F51BA10A}">
+      <p15:sldGuideLst xmlns:p15="http://schemas.microsoft.com/office/powerpoint/2012/main"/>
+    </p:ext>
+  </p:extLst>
 </p:presentation>
 </file>
 
@@ -241,7 +246,7 @@
           <a:p>
             <a:fld id="{298EAF99-6B05-6445-B84C-58FC965C7761}" type="datetimeFigureOut">
               <a:rPr lang="it-IT" smtClean="0"/>
-              <a:t>03/05/20</a:t>
+              <a:t>08/05/2020</a:t>
             </a:fld>
             <a:endParaRPr lang="it-IT"/>
           </a:p>
@@ -411,7 +416,7 @@
           <a:p>
             <a:fld id="{298EAF99-6B05-6445-B84C-58FC965C7761}" type="datetimeFigureOut">
               <a:rPr lang="it-IT" smtClean="0"/>
-              <a:t>03/05/20</a:t>
+              <a:t>08/05/2020</a:t>
             </a:fld>
             <a:endParaRPr lang="it-IT"/>
           </a:p>
@@ -591,7 +596,7 @@
           <a:p>
             <a:fld id="{298EAF99-6B05-6445-B84C-58FC965C7761}" type="datetimeFigureOut">
               <a:rPr lang="it-IT" smtClean="0"/>
-              <a:t>03/05/20</a:t>
+              <a:t>08/05/2020</a:t>
             </a:fld>
             <a:endParaRPr lang="it-IT"/>
           </a:p>
@@ -761,7 +766,7 @@
           <a:p>
             <a:fld id="{298EAF99-6B05-6445-B84C-58FC965C7761}" type="datetimeFigureOut">
               <a:rPr lang="it-IT" smtClean="0"/>
-              <a:t>03/05/20</a:t>
+              <a:t>08/05/2020</a:t>
             </a:fld>
             <a:endParaRPr lang="it-IT"/>
           </a:p>
@@ -1007,7 +1012,7 @@
           <a:p>
             <a:fld id="{298EAF99-6B05-6445-B84C-58FC965C7761}" type="datetimeFigureOut">
               <a:rPr lang="it-IT" smtClean="0"/>
-              <a:t>03/05/20</a:t>
+              <a:t>08/05/2020</a:t>
             </a:fld>
             <a:endParaRPr lang="it-IT"/>
           </a:p>
@@ -1239,7 +1244,7 @@
           <a:p>
             <a:fld id="{298EAF99-6B05-6445-B84C-58FC965C7761}" type="datetimeFigureOut">
               <a:rPr lang="it-IT" smtClean="0"/>
-              <a:t>03/05/20</a:t>
+              <a:t>08/05/2020</a:t>
             </a:fld>
             <a:endParaRPr lang="it-IT"/>
           </a:p>
@@ -1606,7 +1611,7 @@
           <a:p>
             <a:fld id="{298EAF99-6B05-6445-B84C-58FC965C7761}" type="datetimeFigureOut">
               <a:rPr lang="it-IT" smtClean="0"/>
-              <a:t>03/05/20</a:t>
+              <a:t>08/05/2020</a:t>
             </a:fld>
             <a:endParaRPr lang="it-IT"/>
           </a:p>
@@ -1724,7 +1729,7 @@
           <a:p>
             <a:fld id="{298EAF99-6B05-6445-B84C-58FC965C7761}" type="datetimeFigureOut">
               <a:rPr lang="it-IT" smtClean="0"/>
-              <a:t>03/05/20</a:t>
+              <a:t>08/05/2020</a:t>
             </a:fld>
             <a:endParaRPr lang="it-IT"/>
           </a:p>
@@ -1819,7 +1824,7 @@
           <a:p>
             <a:fld id="{298EAF99-6B05-6445-B84C-58FC965C7761}" type="datetimeFigureOut">
               <a:rPr lang="it-IT" smtClean="0"/>
-              <a:t>03/05/20</a:t>
+              <a:t>08/05/2020</a:t>
             </a:fld>
             <a:endParaRPr lang="it-IT"/>
           </a:p>
@@ -2096,7 +2101,7 @@
           <a:p>
             <a:fld id="{298EAF99-6B05-6445-B84C-58FC965C7761}" type="datetimeFigureOut">
               <a:rPr lang="it-IT" smtClean="0"/>
-              <a:t>03/05/20</a:t>
+              <a:t>08/05/2020</a:t>
             </a:fld>
             <a:endParaRPr lang="it-IT"/>
           </a:p>
@@ -2353,7 +2358,7 @@
           <a:p>
             <a:fld id="{298EAF99-6B05-6445-B84C-58FC965C7761}" type="datetimeFigureOut">
               <a:rPr lang="it-IT" smtClean="0"/>
-              <a:t>03/05/20</a:t>
+              <a:t>08/05/2020</a:t>
             </a:fld>
             <a:endParaRPr lang="it-IT"/>
           </a:p>
@@ -2566,7 +2571,7 @@
           <a:p>
             <a:fld id="{298EAF99-6B05-6445-B84C-58FC965C7761}" type="datetimeFigureOut">
               <a:rPr lang="it-IT" smtClean="0"/>
-              <a:t>03/05/20</a:t>
+              <a:t>08/05/2020</a:t>
             </a:fld>
             <a:endParaRPr lang="it-IT"/>
           </a:p>
@@ -3594,10 +3599,10 @@
       </p:cxnSp>
       <p:sp>
         <p:nvSpPr>
-          <p:cNvPr id="23" name="Rettangolo con angoli arrotondati 22">
-            <a:extLst>
-              <a:ext uri="{FF2B5EF4-FFF2-40B4-BE49-F238E27FC236}">
-                <a16:creationId xmlns:a16="http://schemas.microsoft.com/office/drawing/2014/main" id="{DC6D19AB-E29A-2C41-9E40-6383F203F4EC}"/>
+          <p:cNvPr id="25" name="Rettangolo con angoli arrotondati 24">
+            <a:extLst>
+              <a:ext uri="{FF2B5EF4-FFF2-40B4-BE49-F238E27FC236}">
+                <a16:creationId xmlns:a16="http://schemas.microsoft.com/office/drawing/2014/main" id="{4AC45EC6-261B-3E45-A67E-8ED19D3779B9}"/>
               </a:ext>
             </a:extLst>
           </p:cNvPr>
@@ -3606,8 +3611,8 @@
         </p:nvSpPr>
         <p:spPr>
           <a:xfrm>
-            <a:off x="3438400" y="3522424"/>
-            <a:ext cx="749540" cy="552291"/>
+            <a:off x="3782478" y="2429112"/>
+            <a:ext cx="1476534" cy="552291"/>
           </a:xfrm>
           <a:prstGeom prst="roundRect">
             <a:avLst/>
@@ -3651,7 +3656,7 @@
                   <a:schemeClr val="tx1"/>
                 </a:solidFill>
               </a:rPr>
-              <a:t>2.1</a:t>
+              <a:t>2.</a:t>
             </a:r>
           </a:p>
           <a:p>
@@ -3662,17 +3667,17 @@
                   <a:schemeClr val="tx1"/>
                 </a:solidFill>
               </a:rPr>
-              <a:t>Set Site</a:t>
-            </a:r>
-          </a:p>
-        </p:txBody>
-      </p:sp>
-      <p:sp>
-        <p:nvSpPr>
-          <p:cNvPr id="24" name="Rettangolo con angoli arrotondati 23">
-            <a:extLst>
-              <a:ext uri="{FF2B5EF4-FFF2-40B4-BE49-F238E27FC236}">
-                <a16:creationId xmlns:a16="http://schemas.microsoft.com/office/drawing/2014/main" id="{FF22D98C-A8F3-2F40-AB40-36DD3C625976}"/>
+              <a:t>Insert Web Page</a:t>
+            </a:r>
+          </a:p>
+        </p:txBody>
+      </p:sp>
+      <p:sp>
+        <p:nvSpPr>
+          <p:cNvPr id="45" name="Rettangolo con angoli arrotondati 44">
+            <a:extLst>
+              <a:ext uri="{FF2B5EF4-FFF2-40B4-BE49-F238E27FC236}">
+                <a16:creationId xmlns:a16="http://schemas.microsoft.com/office/drawing/2014/main" id="{9B3CBEF5-D816-8E4D-BF72-E076113A3EE3}"/>
               </a:ext>
             </a:extLst>
           </p:cNvPr>
@@ -3681,8 +3686,8 @@
         </p:nvSpPr>
         <p:spPr>
           <a:xfrm>
-            <a:off x="4650369" y="3522422"/>
-            <a:ext cx="836031" cy="552291"/>
+            <a:off x="6799965" y="4660818"/>
+            <a:ext cx="1130763" cy="552291"/>
           </a:xfrm>
           <a:prstGeom prst="roundRect">
             <a:avLst/>
@@ -3726,7 +3731,7 @@
                   <a:schemeClr val="tx1"/>
                 </a:solidFill>
               </a:rPr>
-              <a:t>2.2</a:t>
+              <a:t>3.1.2</a:t>
             </a:r>
           </a:p>
           <a:p>
@@ -3737,17 +3742,17 @@
                   <a:schemeClr val="tx1"/>
                 </a:solidFill>
               </a:rPr>
-              <a:t>Go After</a:t>
-            </a:r>
-          </a:p>
-        </p:txBody>
-      </p:sp>
-      <p:sp>
-        <p:nvSpPr>
-          <p:cNvPr id="25" name="Rettangolo con angoli arrotondati 24">
-            <a:extLst>
-              <a:ext uri="{FF2B5EF4-FFF2-40B4-BE49-F238E27FC236}">
-                <a16:creationId xmlns:a16="http://schemas.microsoft.com/office/drawing/2014/main" id="{4AC45EC6-261B-3E45-A67E-8ED19D3779B9}"/>
+              <a:t>Confirm Choice</a:t>
+            </a:r>
+          </a:p>
+        </p:txBody>
+      </p:sp>
+      <p:sp>
+        <p:nvSpPr>
+          <p:cNvPr id="54" name="Rettangolo con angoli arrotondati 53">
+            <a:extLst>
+              <a:ext uri="{FF2B5EF4-FFF2-40B4-BE49-F238E27FC236}">
+                <a16:creationId xmlns:a16="http://schemas.microsoft.com/office/drawing/2014/main" id="{F46EFA40-3DF2-D540-949A-305A354F82CD}"/>
               </a:ext>
             </a:extLst>
           </p:cNvPr>
@@ -3756,8 +3761,8 @@
         </p:nvSpPr>
         <p:spPr>
           <a:xfrm>
-            <a:off x="3782478" y="2429112"/>
-            <a:ext cx="1476534" cy="552291"/>
+            <a:off x="4990381" y="4661998"/>
+            <a:ext cx="1130763" cy="552291"/>
           </a:xfrm>
           <a:prstGeom prst="roundRect">
             <a:avLst/>
@@ -3801,7 +3806,7 @@
                   <a:schemeClr val="tx1"/>
                 </a:solidFill>
               </a:rPr>
-              <a:t>2.</a:t>
+              <a:t>3.1.1</a:t>
             </a:r>
           </a:p>
           <a:p>
@@ -3812,97 +3817,28 @@
                   <a:schemeClr val="tx1"/>
                 </a:solidFill>
               </a:rPr>
-              <a:t>Insert Web Page</a:t>
-            </a:r>
-          </a:p>
-        </p:txBody>
-      </p:sp>
-      <p:cxnSp>
-        <p:nvCxnSpPr>
-          <p:cNvPr id="27" name="Connettore 4 26">
-            <a:extLst>
-              <a:ext uri="{FF2B5EF4-FFF2-40B4-BE49-F238E27FC236}">
-                <a16:creationId xmlns:a16="http://schemas.microsoft.com/office/drawing/2014/main" id="{C1E2783B-DFF1-7F49-B09F-8D819FE29809}"/>
-              </a:ext>
-            </a:extLst>
-          </p:cNvPr>
-          <p:cNvCxnSpPr>
-            <a:cxnSpLocks/>
-            <a:stCxn id="25" idx="2"/>
-            <a:endCxn id="23" idx="0"/>
-          </p:cNvCxnSpPr>
-          <p:nvPr/>
-        </p:nvCxnSpPr>
-        <p:spPr>
-          <a:xfrm rot="5400000">
-            <a:off x="3896448" y="2898126"/>
-            <a:ext cx="541021" cy="707575"/>
-          </a:xfrm>
-          <a:prstGeom prst="bentConnector3">
-            <a:avLst/>
-          </a:prstGeom>
-        </p:spPr>
-        <p:style>
-          <a:lnRef idx="1">
-            <a:schemeClr val="dk1"/>
-          </a:lnRef>
-          <a:fillRef idx="0">
-            <a:schemeClr val="dk1"/>
-          </a:fillRef>
-          <a:effectRef idx="0">
-            <a:schemeClr val="dk1"/>
-          </a:effectRef>
-          <a:fontRef idx="minor">
-            <a:schemeClr val="tx1"/>
-          </a:fontRef>
-        </p:style>
-      </p:cxnSp>
-      <p:cxnSp>
-        <p:nvCxnSpPr>
-          <p:cNvPr id="29" name="Connettore 4 28">
-            <a:extLst>
-              <a:ext uri="{FF2B5EF4-FFF2-40B4-BE49-F238E27FC236}">
-                <a16:creationId xmlns:a16="http://schemas.microsoft.com/office/drawing/2014/main" id="{487E322D-2B8D-B746-9918-646D2502B107}"/>
-              </a:ext>
-            </a:extLst>
-          </p:cNvPr>
-          <p:cNvCxnSpPr>
-            <a:cxnSpLocks/>
-            <a:stCxn id="25" idx="2"/>
-            <a:endCxn id="24" idx="0"/>
-          </p:cNvCxnSpPr>
-          <p:nvPr/>
-        </p:nvCxnSpPr>
-        <p:spPr>
-          <a:xfrm rot="16200000" flipH="1">
-            <a:off x="4524056" y="2978092"/>
-            <a:ext cx="541019" cy="547640"/>
-          </a:xfrm>
-          <a:prstGeom prst="bentConnector3">
-            <a:avLst/>
-          </a:prstGeom>
-        </p:spPr>
-        <p:style>
-          <a:lnRef idx="1">
-            <a:schemeClr val="dk1"/>
-          </a:lnRef>
-          <a:fillRef idx="0">
-            <a:schemeClr val="dk1"/>
-          </a:fillRef>
-          <a:effectRef idx="0">
-            <a:schemeClr val="dk1"/>
-          </a:effectRef>
-          <a:fontRef idx="minor">
-            <a:schemeClr val="tx1"/>
-          </a:fontRef>
-        </p:style>
-      </p:cxnSp>
-      <p:sp>
-        <p:nvSpPr>
-          <p:cNvPr id="42" name="Rettangolo con angoli arrotondati 41">
-            <a:extLst>
-              <a:ext uri="{FF2B5EF4-FFF2-40B4-BE49-F238E27FC236}">
-                <a16:creationId xmlns:a16="http://schemas.microsoft.com/office/drawing/2014/main" id="{50B59B87-47B9-164E-B617-48C9A996BCEC}"/>
+              <a:t>Choose</a:t>
+            </a:r>
+          </a:p>
+          <a:p>
+            <a:pPr algn="ctr"/>
+            <a:r>
+              <a:rPr lang="en-GB" sz="1242" dirty="0">
+                <a:solidFill>
+                  <a:schemeClr val="tx1"/>
+                </a:solidFill>
+              </a:rPr>
+              <a:t>Category</a:t>
+            </a:r>
+          </a:p>
+        </p:txBody>
+      </p:sp>
+      <p:sp>
+        <p:nvSpPr>
+          <p:cNvPr id="55" name="Rettangolo con angoli arrotondati 54">
+            <a:extLst>
+              <a:ext uri="{FF2B5EF4-FFF2-40B4-BE49-F238E27FC236}">
+                <a16:creationId xmlns:a16="http://schemas.microsoft.com/office/drawing/2014/main" id="{78DCE3F5-1BBD-2144-9F20-642BC4336E95}"/>
               </a:ext>
             </a:extLst>
           </p:cNvPr>
@@ -3911,8 +3847,8 @@
         </p:nvSpPr>
         <p:spPr>
           <a:xfrm>
-            <a:off x="5306491" y="5714801"/>
-            <a:ext cx="836031" cy="552291"/>
+            <a:off x="5910459" y="3522420"/>
+            <a:ext cx="1575238" cy="552291"/>
           </a:xfrm>
           <a:prstGeom prst="roundRect">
             <a:avLst/>
@@ -3956,7 +3892,7 @@
                   <a:schemeClr val="tx1"/>
                 </a:solidFill>
               </a:rPr>
-              <a:t>3.1.2.1</a:t>
+              <a:t>3.1</a:t>
             </a:r>
           </a:p>
           <a:p>
@@ -3967,17 +3903,97 @@
                   <a:schemeClr val="tx1"/>
                 </a:solidFill>
               </a:rPr>
-              <a:t>Yes</a:t>
-            </a:r>
-          </a:p>
-        </p:txBody>
-      </p:sp>
-      <p:sp>
-        <p:nvSpPr>
-          <p:cNvPr id="44" name="Rettangolo con angoli arrotondati 43">
-            <a:extLst>
-              <a:ext uri="{FF2B5EF4-FFF2-40B4-BE49-F238E27FC236}">
-                <a16:creationId xmlns:a16="http://schemas.microsoft.com/office/drawing/2014/main" id="{FFD462B2-E10C-F640-8395-52DC8D51885D}"/>
+              <a:t>Add Category</a:t>
+            </a:r>
+          </a:p>
+        </p:txBody>
+      </p:sp>
+      <p:cxnSp>
+        <p:nvCxnSpPr>
+          <p:cNvPr id="57" name="Connettore 4 56">
+            <a:extLst>
+              <a:ext uri="{FF2B5EF4-FFF2-40B4-BE49-F238E27FC236}">
+                <a16:creationId xmlns:a16="http://schemas.microsoft.com/office/drawing/2014/main" id="{D27D5063-8A7D-2F4D-B45F-C189248CCC3F}"/>
+              </a:ext>
+            </a:extLst>
+          </p:cNvPr>
+          <p:cNvCxnSpPr>
+            <a:cxnSpLocks/>
+            <a:stCxn id="55" idx="2"/>
+            <a:endCxn id="54" idx="0"/>
+          </p:cNvCxnSpPr>
+          <p:nvPr/>
+        </p:nvCxnSpPr>
+        <p:spPr>
+          <a:xfrm rot="5400000">
+            <a:off x="5833278" y="3797197"/>
+            <a:ext cx="587287" cy="1142315"/>
+          </a:xfrm>
+          <a:prstGeom prst="bentConnector3">
+            <a:avLst/>
+          </a:prstGeom>
+        </p:spPr>
+        <p:style>
+          <a:lnRef idx="1">
+            <a:schemeClr val="dk1"/>
+          </a:lnRef>
+          <a:fillRef idx="0">
+            <a:schemeClr val="dk1"/>
+          </a:fillRef>
+          <a:effectRef idx="0">
+            <a:schemeClr val="dk1"/>
+          </a:effectRef>
+          <a:fontRef idx="minor">
+            <a:schemeClr val="tx1"/>
+          </a:fontRef>
+        </p:style>
+      </p:cxnSp>
+      <p:cxnSp>
+        <p:nvCxnSpPr>
+          <p:cNvPr id="59" name="Connettore 4 58">
+            <a:extLst>
+              <a:ext uri="{FF2B5EF4-FFF2-40B4-BE49-F238E27FC236}">
+                <a16:creationId xmlns:a16="http://schemas.microsoft.com/office/drawing/2014/main" id="{AF0D9B65-BD88-5B42-8F39-A94195048A7A}"/>
+              </a:ext>
+            </a:extLst>
+          </p:cNvPr>
+          <p:cNvCxnSpPr>
+            <a:cxnSpLocks/>
+            <a:stCxn id="55" idx="2"/>
+            <a:endCxn id="45" idx="0"/>
+          </p:cNvCxnSpPr>
+          <p:nvPr/>
+        </p:nvCxnSpPr>
+        <p:spPr>
+          <a:xfrm rot="16200000" flipH="1">
+            <a:off x="6738659" y="4034129"/>
+            <a:ext cx="586107" cy="667269"/>
+          </a:xfrm>
+          <a:prstGeom prst="bentConnector3">
+            <a:avLst/>
+          </a:prstGeom>
+        </p:spPr>
+        <p:style>
+          <a:lnRef idx="1">
+            <a:schemeClr val="dk1"/>
+          </a:lnRef>
+          <a:fillRef idx="0">
+            <a:schemeClr val="dk1"/>
+          </a:fillRef>
+          <a:effectRef idx="0">
+            <a:schemeClr val="dk1"/>
+          </a:effectRef>
+          <a:fontRef idx="minor">
+            <a:schemeClr val="tx1"/>
+          </a:fontRef>
+        </p:style>
+      </p:cxnSp>
+      <p:sp>
+        <p:nvSpPr>
+          <p:cNvPr id="60" name="Rettangolo con angoli arrotondati 59">
+            <a:extLst>
+              <a:ext uri="{FF2B5EF4-FFF2-40B4-BE49-F238E27FC236}">
+                <a16:creationId xmlns:a16="http://schemas.microsoft.com/office/drawing/2014/main" id="{BEC3206E-74E6-1344-8986-758C6934AE8E}"/>
               </a:ext>
             </a:extLst>
           </p:cNvPr>
@@ -3986,8 +4002,8 @@
         </p:nvSpPr>
         <p:spPr>
           <a:xfrm>
-            <a:off x="7350046" y="5715656"/>
-            <a:ext cx="836031" cy="552291"/>
+            <a:off x="8541022" y="5715655"/>
+            <a:ext cx="1169361" cy="552291"/>
           </a:xfrm>
           <a:prstGeom prst="roundRect">
             <a:avLst/>
@@ -4031,7 +4047,7 @@
                   <a:schemeClr val="tx1"/>
                 </a:solidFill>
               </a:rPr>
-              <a:t>3.1.2.2</a:t>
+              <a:t>3.2.1.1</a:t>
             </a:r>
           </a:p>
           <a:p>
@@ -4042,17 +4058,17 @@
                   <a:schemeClr val="tx1"/>
                 </a:solidFill>
               </a:rPr>
-              <a:t>No</a:t>
-            </a:r>
-          </a:p>
-        </p:txBody>
-      </p:sp>
-      <p:sp>
-        <p:nvSpPr>
-          <p:cNvPr id="45" name="Rettangolo con angoli arrotondati 44">
-            <a:extLst>
-              <a:ext uri="{FF2B5EF4-FFF2-40B4-BE49-F238E27FC236}">
-                <a16:creationId xmlns:a16="http://schemas.microsoft.com/office/drawing/2014/main" id="{9B3CBEF5-D816-8E4D-BF72-E076113A3EE3}"/>
+              <a:t>Pick Branch</a:t>
+            </a:r>
+          </a:p>
+        </p:txBody>
+      </p:sp>
+      <p:sp>
+        <p:nvSpPr>
+          <p:cNvPr id="61" name="Rettangolo con angoli arrotondati 60">
+            <a:extLst>
+              <a:ext uri="{FF2B5EF4-FFF2-40B4-BE49-F238E27FC236}">
+                <a16:creationId xmlns:a16="http://schemas.microsoft.com/office/drawing/2014/main" id="{BD9D4811-3E16-1845-BE42-E5CAF8498531}"/>
               </a:ext>
             </a:extLst>
           </p:cNvPr>
@@ -4061,8 +4077,8 @@
         </p:nvSpPr>
         <p:spPr>
           <a:xfrm>
-            <a:off x="6799965" y="4660818"/>
-            <a:ext cx="1130763" cy="552291"/>
+            <a:off x="9866195" y="5715656"/>
+            <a:ext cx="1169361" cy="552291"/>
           </a:xfrm>
           <a:prstGeom prst="roundRect">
             <a:avLst/>
@@ -4106,7 +4122,7 @@
                   <a:schemeClr val="tx1"/>
                 </a:solidFill>
               </a:rPr>
-              <a:t>3.1.2</a:t>
+              <a:t>3.2.1.2</a:t>
             </a:r>
           </a:p>
           <a:p>
@@ -4117,102 +4133,17 @@
                   <a:schemeClr val="tx1"/>
                 </a:solidFill>
               </a:rPr>
-              <a:t>Confirm Choice</a:t>
-            </a:r>
-          </a:p>
-        </p:txBody>
-      </p:sp>
-      <p:cxnSp>
-        <p:nvCxnSpPr>
-          <p:cNvPr id="47" name="Connettore 4 46">
-            <a:extLst>
-              <a:ext uri="{FF2B5EF4-FFF2-40B4-BE49-F238E27FC236}">
-                <a16:creationId xmlns:a16="http://schemas.microsoft.com/office/drawing/2014/main" id="{9A0C1248-4DA8-8148-BAE5-A589FBEDC239}"/>
-              </a:ext>
-            </a:extLst>
-          </p:cNvPr>
-          <p:cNvCxnSpPr>
-            <a:cxnSpLocks/>
-            <a:stCxn id="45" idx="2"/>
-            <a:endCxn id="42" idx="0"/>
-          </p:cNvCxnSpPr>
-          <p:nvPr/>
-        </p:nvCxnSpPr>
-        <p:spPr>
-          <a:xfrm rot="5400000">
-            <a:off x="6294081" y="4643535"/>
-            <a:ext cx="501692" cy="1640840"/>
-          </a:xfrm>
-          <a:prstGeom prst="bentConnector3">
-            <a:avLst/>
-          </a:prstGeom>
-        </p:spPr>
-        <p:style>
-          <a:lnRef idx="1">
-            <a:schemeClr val="dk1"/>
-          </a:lnRef>
-          <a:fillRef idx="0">
-            <a:schemeClr val="dk1"/>
-          </a:fillRef>
-          <a:effectRef idx="0">
-            <a:schemeClr val="dk1"/>
-          </a:effectRef>
-          <a:fontRef idx="minor">
-            <a:schemeClr val="tx1"/>
-          </a:fontRef>
-        </p:style>
-      </p:cxnSp>
-      <p:cxnSp>
-        <p:nvCxnSpPr>
-          <p:cNvPr id="49" name="Connettore 4 48">
-            <a:extLst>
-              <a:ext uri="{FF2B5EF4-FFF2-40B4-BE49-F238E27FC236}">
-                <a16:creationId xmlns:a16="http://schemas.microsoft.com/office/drawing/2014/main" id="{24580B74-349A-7944-9CCC-AF4ADA51C9E3}"/>
-              </a:ext>
-            </a:extLst>
-          </p:cNvPr>
-          <p:cNvCxnSpPr>
-            <a:cxnSpLocks/>
-            <a:stCxn id="45" idx="2"/>
-            <a:endCxn id="44" idx="0"/>
-          </p:cNvCxnSpPr>
-          <p:nvPr/>
-        </p:nvCxnSpPr>
-        <p:spPr>
-          <a:xfrm rot="16200000" flipH="1">
-            <a:off x="7315431" y="5263024"/>
-            <a:ext cx="502547" cy="402715"/>
-          </a:xfrm>
-          <a:prstGeom prst="bentConnector3">
-            <a:avLst/>
-          </a:prstGeom>
-          <a:ln>
-            <a:solidFill>
-              <a:schemeClr val="tx1"/>
-            </a:solidFill>
-          </a:ln>
-        </p:spPr>
-        <p:style>
-          <a:lnRef idx="1">
-            <a:schemeClr val="accent1"/>
-          </a:lnRef>
-          <a:fillRef idx="0">
-            <a:schemeClr val="accent1"/>
-          </a:fillRef>
-          <a:effectRef idx="0">
-            <a:schemeClr val="accent1"/>
-          </a:effectRef>
-          <a:fontRef idx="minor">
-            <a:schemeClr val="tx1"/>
-          </a:fontRef>
-        </p:style>
-      </p:cxnSp>
-      <p:sp>
-        <p:nvSpPr>
-          <p:cNvPr id="54" name="Rettangolo con angoli arrotondati 53">
-            <a:extLst>
-              <a:ext uri="{FF2B5EF4-FFF2-40B4-BE49-F238E27FC236}">
-                <a16:creationId xmlns:a16="http://schemas.microsoft.com/office/drawing/2014/main" id="{F46EFA40-3DF2-D540-949A-305A354F82CD}"/>
+              <a:t>Push Position Button</a:t>
+            </a:r>
+          </a:p>
+        </p:txBody>
+      </p:sp>
+      <p:sp>
+        <p:nvSpPr>
+          <p:cNvPr id="63" name="Rettangolo con angoli arrotondati 62">
+            <a:extLst>
+              <a:ext uri="{FF2B5EF4-FFF2-40B4-BE49-F238E27FC236}">
+                <a16:creationId xmlns:a16="http://schemas.microsoft.com/office/drawing/2014/main" id="{1263863D-C70F-7748-A604-B1E01F4084D8}"/>
               </a:ext>
             </a:extLst>
           </p:cNvPr>
@@ -4221,8 +4152,8 @@
         </p:nvSpPr>
         <p:spPr>
           <a:xfrm>
-            <a:off x="4990381" y="4661998"/>
-            <a:ext cx="1130763" cy="552291"/>
+            <a:off x="11191368" y="5715655"/>
+            <a:ext cx="1169361" cy="552291"/>
           </a:xfrm>
           <a:prstGeom prst="roundRect">
             <a:avLst/>
@@ -4266,7 +4197,7 @@
                   <a:schemeClr val="tx1"/>
                 </a:solidFill>
               </a:rPr>
-              <a:t>3.1.1</a:t>
+              <a:t>3.2.1.3</a:t>
             </a:r>
           </a:p>
           <a:p>
@@ -4277,7 +4208,7 @@
                   <a:schemeClr val="tx1"/>
                 </a:solidFill>
               </a:rPr>
-              <a:t>Choose</a:t>
+              <a:t>Share Current</a:t>
             </a:r>
           </a:p>
           <a:p>
@@ -4288,17 +4219,17 @@
                   <a:schemeClr val="tx1"/>
                 </a:solidFill>
               </a:rPr>
-              <a:t>Category</a:t>
-            </a:r>
-          </a:p>
-        </p:txBody>
-      </p:sp>
-      <p:sp>
-        <p:nvSpPr>
-          <p:cNvPr id="55" name="Rettangolo con angoli arrotondati 54">
-            <a:extLst>
-              <a:ext uri="{FF2B5EF4-FFF2-40B4-BE49-F238E27FC236}">
-                <a16:creationId xmlns:a16="http://schemas.microsoft.com/office/drawing/2014/main" id="{78DCE3F5-1BBD-2144-9F20-642BC4336E95}"/>
+              <a:t>Position</a:t>
+            </a:r>
+          </a:p>
+        </p:txBody>
+      </p:sp>
+      <p:sp>
+        <p:nvSpPr>
+          <p:cNvPr id="64" name="Rettangolo con angoli arrotondati 63">
+            <a:extLst>
+              <a:ext uri="{FF2B5EF4-FFF2-40B4-BE49-F238E27FC236}">
+                <a16:creationId xmlns:a16="http://schemas.microsoft.com/office/drawing/2014/main" id="{B7ACC753-F1A4-AA4B-B722-8F70B4B8E522}"/>
               </a:ext>
             </a:extLst>
           </p:cNvPr>
@@ -4307,8 +4238,8 @@
         </p:nvSpPr>
         <p:spPr>
           <a:xfrm>
-            <a:off x="5910459" y="3522420"/>
-            <a:ext cx="1575238" cy="552291"/>
+            <a:off x="9021348" y="4660816"/>
+            <a:ext cx="1130763" cy="552291"/>
           </a:xfrm>
           <a:prstGeom prst="roundRect">
             <a:avLst/>
@@ -4352,7 +4283,7 @@
                   <a:schemeClr val="tx1"/>
                 </a:solidFill>
               </a:rPr>
-              <a:t>3.1</a:t>
+              <a:t>3.2.1</a:t>
             </a:r>
           </a:p>
           <a:p>
@@ -4363,31 +4294,30 @@
                   <a:schemeClr val="tx1"/>
                 </a:solidFill>
               </a:rPr>
-              <a:t>Add Category</a:t>
+              <a:t>Default Sharing</a:t>
             </a:r>
           </a:p>
         </p:txBody>
       </p:sp>
       <p:cxnSp>
         <p:nvCxnSpPr>
-          <p:cNvPr id="57" name="Connettore 4 56">
-            <a:extLst>
-              <a:ext uri="{FF2B5EF4-FFF2-40B4-BE49-F238E27FC236}">
-                <a16:creationId xmlns:a16="http://schemas.microsoft.com/office/drawing/2014/main" id="{D27D5063-8A7D-2F4D-B45F-C189248CCC3F}"/>
+          <p:cNvPr id="66" name="Connettore 4 65">
+            <a:extLst>
+              <a:ext uri="{FF2B5EF4-FFF2-40B4-BE49-F238E27FC236}">
+                <a16:creationId xmlns:a16="http://schemas.microsoft.com/office/drawing/2014/main" id="{13EA4ADE-08E6-064A-B77B-1EF9498DA730}"/>
               </a:ext>
             </a:extLst>
           </p:cNvPr>
           <p:cNvCxnSpPr>
-            <a:cxnSpLocks/>
-            <a:stCxn id="55" idx="2"/>
-            <a:endCxn id="54" idx="0"/>
+            <a:stCxn id="64" idx="2"/>
+            <a:endCxn id="63" idx="0"/>
           </p:cNvCxnSpPr>
           <p:nvPr/>
         </p:nvCxnSpPr>
         <p:spPr>
-          <a:xfrm rot="5400000">
-            <a:off x="5833278" y="3797197"/>
-            <a:ext cx="587287" cy="1142315"/>
+          <a:xfrm rot="16200000" flipH="1">
+            <a:off x="10430115" y="4369721"/>
+            <a:ext cx="502548" cy="2189319"/>
           </a:xfrm>
           <a:prstGeom prst="bentConnector3">
             <a:avLst/>
@@ -4410,24 +4340,23 @@
       </p:cxnSp>
       <p:cxnSp>
         <p:nvCxnSpPr>
-          <p:cNvPr id="59" name="Connettore 4 58">
-            <a:extLst>
-              <a:ext uri="{FF2B5EF4-FFF2-40B4-BE49-F238E27FC236}">
-                <a16:creationId xmlns:a16="http://schemas.microsoft.com/office/drawing/2014/main" id="{AF0D9B65-BD88-5B42-8F39-A94195048A7A}"/>
+          <p:cNvPr id="68" name="Connettore 4 67">
+            <a:extLst>
+              <a:ext uri="{FF2B5EF4-FFF2-40B4-BE49-F238E27FC236}">
+                <a16:creationId xmlns:a16="http://schemas.microsoft.com/office/drawing/2014/main" id="{4FBB0CA8-769A-914E-B2E1-4297180C33D8}"/>
               </a:ext>
             </a:extLst>
           </p:cNvPr>
           <p:cNvCxnSpPr>
-            <a:cxnSpLocks/>
-            <a:stCxn id="55" idx="2"/>
-            <a:endCxn id="45" idx="0"/>
+            <a:stCxn id="64" idx="2"/>
+            <a:endCxn id="61" idx="0"/>
           </p:cNvCxnSpPr>
           <p:nvPr/>
         </p:nvCxnSpPr>
         <p:spPr>
           <a:xfrm rot="16200000" flipH="1">
-            <a:off x="6738659" y="4034129"/>
-            <a:ext cx="586107" cy="667269"/>
+            <a:off x="9767529" y="5032308"/>
+            <a:ext cx="502549" cy="864146"/>
           </a:xfrm>
           <a:prstGeom prst="bentConnector3">
             <a:avLst/>
@@ -4448,12 +4377,51 @@
           </a:fontRef>
         </p:style>
       </p:cxnSp>
-      <p:sp>
-        <p:nvSpPr>
-          <p:cNvPr id="60" name="Rettangolo con angoli arrotondati 59">
-            <a:extLst>
-              <a:ext uri="{FF2B5EF4-FFF2-40B4-BE49-F238E27FC236}">
-                <a16:creationId xmlns:a16="http://schemas.microsoft.com/office/drawing/2014/main" id="{BEC3206E-74E6-1344-8986-758C6934AE8E}"/>
+      <p:cxnSp>
+        <p:nvCxnSpPr>
+          <p:cNvPr id="70" name="Connettore 4 69">
+            <a:extLst>
+              <a:ext uri="{FF2B5EF4-FFF2-40B4-BE49-F238E27FC236}">
+                <a16:creationId xmlns:a16="http://schemas.microsoft.com/office/drawing/2014/main" id="{3378B7C3-E06A-AE4A-87B9-E32BA57B21AC}"/>
+              </a:ext>
+            </a:extLst>
+          </p:cNvPr>
+          <p:cNvCxnSpPr>
+            <a:stCxn id="64" idx="2"/>
+            <a:endCxn id="60" idx="0"/>
+          </p:cNvCxnSpPr>
+          <p:nvPr/>
+        </p:nvCxnSpPr>
+        <p:spPr>
+          <a:xfrm rot="5400000">
+            <a:off x="9104943" y="5233868"/>
+            <a:ext cx="502548" cy="461027"/>
+          </a:xfrm>
+          <a:prstGeom prst="bentConnector3">
+            <a:avLst/>
+          </a:prstGeom>
+        </p:spPr>
+        <p:style>
+          <a:lnRef idx="1">
+            <a:schemeClr val="dk1"/>
+          </a:lnRef>
+          <a:fillRef idx="0">
+            <a:schemeClr val="dk1"/>
+          </a:fillRef>
+          <a:effectRef idx="0">
+            <a:schemeClr val="dk1"/>
+          </a:effectRef>
+          <a:fontRef idx="minor">
+            <a:schemeClr val="tx1"/>
+          </a:fontRef>
+        </p:style>
+      </p:cxnSp>
+      <p:sp>
+        <p:nvSpPr>
+          <p:cNvPr id="74" name="Rettangolo con angoli arrotondati 73">
+            <a:extLst>
+              <a:ext uri="{FF2B5EF4-FFF2-40B4-BE49-F238E27FC236}">
+                <a16:creationId xmlns:a16="http://schemas.microsoft.com/office/drawing/2014/main" id="{7D7BCCA1-BFFE-DD48-BBA4-0010CE39D9BD}"/>
               </a:ext>
             </a:extLst>
           </p:cNvPr>
@@ -4462,8 +4430,8 @@
         </p:nvSpPr>
         <p:spPr>
           <a:xfrm>
-            <a:off x="8541022" y="5715655"/>
-            <a:ext cx="1169361" cy="552291"/>
+            <a:off x="10547795" y="4660816"/>
+            <a:ext cx="1130763" cy="552291"/>
           </a:xfrm>
           <a:prstGeom prst="roundRect">
             <a:avLst/>
@@ -4507,7 +4475,7 @@
                   <a:schemeClr val="tx1"/>
                 </a:solidFill>
               </a:rPr>
-              <a:t>3.2.1.1</a:t>
+              <a:t>3.2.2</a:t>
             </a:r>
           </a:p>
           <a:p>
@@ -4518,17 +4486,28 @@
                   <a:schemeClr val="tx1"/>
                 </a:solidFill>
               </a:rPr>
-              <a:t>Pick Branch</a:t>
-            </a:r>
-          </a:p>
-        </p:txBody>
-      </p:sp>
-      <p:sp>
-        <p:nvSpPr>
-          <p:cNvPr id="61" name="Rettangolo con angoli arrotondati 60">
-            <a:extLst>
-              <a:ext uri="{FF2B5EF4-FFF2-40B4-BE49-F238E27FC236}">
-                <a16:creationId xmlns:a16="http://schemas.microsoft.com/office/drawing/2014/main" id="{BD9D4811-3E16-1845-BE42-E5CAF8498531}"/>
+              <a:t>Write</a:t>
+            </a:r>
+          </a:p>
+          <a:p>
+            <a:pPr algn="ctr"/>
+            <a:r>
+              <a:rPr lang="en-GB" sz="1242" dirty="0">
+                <a:solidFill>
+                  <a:schemeClr val="tx1"/>
+                </a:solidFill>
+              </a:rPr>
+              <a:t>Address</a:t>
+            </a:r>
+          </a:p>
+        </p:txBody>
+      </p:sp>
+      <p:sp>
+        <p:nvSpPr>
+          <p:cNvPr id="75" name="Rettangolo con angoli arrotondati 74">
+            <a:extLst>
+              <a:ext uri="{FF2B5EF4-FFF2-40B4-BE49-F238E27FC236}">
+                <a16:creationId xmlns:a16="http://schemas.microsoft.com/office/drawing/2014/main" id="{28ABA5BC-4810-6044-A7E5-D919D393FFF8}"/>
               </a:ext>
             </a:extLst>
           </p:cNvPr>
@@ -4537,8 +4516,8 @@
         </p:nvSpPr>
         <p:spPr>
           <a:xfrm>
-            <a:off x="9866195" y="5715656"/>
-            <a:ext cx="1169361" cy="552291"/>
+            <a:off x="9561308" y="3522421"/>
+            <a:ext cx="1575237" cy="552291"/>
           </a:xfrm>
           <a:prstGeom prst="roundRect">
             <a:avLst/>
@@ -4582,7 +4561,7 @@
                   <a:schemeClr val="tx1"/>
                 </a:solidFill>
               </a:rPr>
-              <a:t>3.2.1.2</a:t>
+              <a:t>3.2</a:t>
             </a:r>
           </a:p>
           <a:p>
@@ -4593,17 +4572,99 @@
                   <a:schemeClr val="tx1"/>
                 </a:solidFill>
               </a:rPr>
-              <a:t>Push Position Button</a:t>
-            </a:r>
-          </a:p>
-        </p:txBody>
-      </p:sp>
-      <p:sp>
-        <p:nvSpPr>
-          <p:cNvPr id="63" name="Rettangolo con angoli arrotondati 62">
-            <a:extLst>
-              <a:ext uri="{FF2B5EF4-FFF2-40B4-BE49-F238E27FC236}">
-                <a16:creationId xmlns:a16="http://schemas.microsoft.com/office/drawing/2014/main" id="{1263863D-C70F-7748-A604-B1E01F4084D8}"/>
+              <a:t>Add Position</a:t>
+            </a:r>
+          </a:p>
+        </p:txBody>
+      </p:sp>
+      <p:cxnSp>
+        <p:nvCxnSpPr>
+          <p:cNvPr id="91" name="Connettore 4 90">
+            <a:extLst>
+              <a:ext uri="{FF2B5EF4-FFF2-40B4-BE49-F238E27FC236}">
+                <a16:creationId xmlns:a16="http://schemas.microsoft.com/office/drawing/2014/main" id="{10A14FCB-50A6-674C-AB8A-F0F629B18AA3}"/>
+              </a:ext>
+            </a:extLst>
+          </p:cNvPr>
+          <p:cNvCxnSpPr>
+            <a:cxnSpLocks/>
+            <a:stCxn id="75" idx="2"/>
+            <a:endCxn id="64" idx="0"/>
+          </p:cNvCxnSpPr>
+          <p:nvPr/>
+        </p:nvCxnSpPr>
+        <p:spPr>
+          <a:xfrm rot="5400000">
+            <a:off x="9674777" y="3986666"/>
+            <a:ext cx="586104" cy="762197"/>
+          </a:xfrm>
+          <a:prstGeom prst="bentConnector3">
+            <a:avLst>
+              <a:gd name="adj1" fmla="val 50000"/>
+            </a:avLst>
+          </a:prstGeom>
+        </p:spPr>
+        <p:style>
+          <a:lnRef idx="1">
+            <a:schemeClr val="dk1"/>
+          </a:lnRef>
+          <a:fillRef idx="0">
+            <a:schemeClr val="dk1"/>
+          </a:fillRef>
+          <a:effectRef idx="0">
+            <a:schemeClr val="dk1"/>
+          </a:effectRef>
+          <a:fontRef idx="minor">
+            <a:schemeClr val="tx1"/>
+          </a:fontRef>
+        </p:style>
+      </p:cxnSp>
+      <p:cxnSp>
+        <p:nvCxnSpPr>
+          <p:cNvPr id="94" name="Connettore 4 93">
+            <a:extLst>
+              <a:ext uri="{FF2B5EF4-FFF2-40B4-BE49-F238E27FC236}">
+                <a16:creationId xmlns:a16="http://schemas.microsoft.com/office/drawing/2014/main" id="{6372FE11-3526-564F-A93E-290DF6574A73}"/>
+              </a:ext>
+            </a:extLst>
+          </p:cNvPr>
+          <p:cNvCxnSpPr>
+            <a:cxnSpLocks/>
+            <a:stCxn id="75" idx="2"/>
+            <a:endCxn id="74" idx="0"/>
+          </p:cNvCxnSpPr>
+          <p:nvPr/>
+        </p:nvCxnSpPr>
+        <p:spPr>
+          <a:xfrm rot="16200000" flipH="1">
+            <a:off x="10438000" y="3985639"/>
+            <a:ext cx="586104" cy="764250"/>
+          </a:xfrm>
+          <a:prstGeom prst="bentConnector3">
+            <a:avLst/>
+          </a:prstGeom>
+        </p:spPr>
+        <p:style>
+          <a:lnRef idx="1">
+            <a:schemeClr val="dk1"/>
+          </a:lnRef>
+          <a:fillRef idx="0">
+            <a:schemeClr val="dk1"/>
+          </a:fillRef>
+          <a:effectRef idx="0">
+            <a:schemeClr val="dk1"/>
+          </a:effectRef>
+          <a:fontRef idx="minor">
+            <a:schemeClr val="tx1"/>
+          </a:fontRef>
+        </p:style>
+      </p:cxnSp>
+      <p:sp>
+        <p:nvSpPr>
+          <p:cNvPr id="103" name="Rettangolo con angoli arrotondati 102">
+            <a:extLst>
+              <a:ext uri="{FF2B5EF4-FFF2-40B4-BE49-F238E27FC236}">
+                <a16:creationId xmlns:a16="http://schemas.microsoft.com/office/drawing/2014/main" id="{550FD913-98C2-7B46-98CA-ACB4EE23C37E}"/>
               </a:ext>
             </a:extLst>
           </p:cNvPr>
@@ -4612,8 +4673,8 @@
         </p:nvSpPr>
         <p:spPr>
           <a:xfrm>
-            <a:off x="11191368" y="5715655"/>
-            <a:ext cx="1169361" cy="552291"/>
+            <a:off x="7730269" y="2429111"/>
+            <a:ext cx="1476534" cy="552291"/>
           </a:xfrm>
           <a:prstGeom prst="roundRect">
             <a:avLst/>
@@ -4657,7 +4718,7 @@
                   <a:schemeClr val="tx1"/>
                 </a:solidFill>
               </a:rPr>
-              <a:t>3.2.1.3</a:t>
+              <a:t>3. </a:t>
             </a:r>
           </a:p>
           <a:p>
@@ -4668,28 +4729,95 @@
                   <a:schemeClr val="tx1"/>
                 </a:solidFill>
               </a:rPr>
-              <a:t>Share Current</a:t>
-            </a:r>
-          </a:p>
-          <a:p>
-            <a:pPr algn="ctr"/>
-            <a:r>
-              <a:rPr lang="en-GB" sz="1242" dirty="0">
-                <a:solidFill>
-                  <a:schemeClr val="tx1"/>
-                </a:solidFill>
-              </a:rPr>
-              <a:t>Position</a:t>
-            </a:r>
-          </a:p>
-        </p:txBody>
-      </p:sp>
-      <p:sp>
-        <p:nvSpPr>
-          <p:cNvPr id="64" name="Rettangolo con angoli arrotondati 63">
-            <a:extLst>
-              <a:ext uri="{FF2B5EF4-FFF2-40B4-BE49-F238E27FC236}">
-                <a16:creationId xmlns:a16="http://schemas.microsoft.com/office/drawing/2014/main" id="{B7ACC753-F1A4-AA4B-B722-8F70B4B8E522}"/>
+              <a:t>Insert Shop Data</a:t>
+            </a:r>
+          </a:p>
+        </p:txBody>
+      </p:sp>
+      <p:cxnSp>
+        <p:nvCxnSpPr>
+          <p:cNvPr id="105" name="Connettore 4 104">
+            <a:extLst>
+              <a:ext uri="{FF2B5EF4-FFF2-40B4-BE49-F238E27FC236}">
+                <a16:creationId xmlns:a16="http://schemas.microsoft.com/office/drawing/2014/main" id="{BEFE228F-8612-F542-8055-451E7961F785}"/>
+              </a:ext>
+            </a:extLst>
+          </p:cNvPr>
+          <p:cNvCxnSpPr>
+            <a:stCxn id="103" idx="2"/>
+            <a:endCxn id="55" idx="0"/>
+          </p:cNvCxnSpPr>
+          <p:nvPr/>
+        </p:nvCxnSpPr>
+        <p:spPr>
+          <a:xfrm rot="5400000">
+            <a:off x="7312798" y="2366682"/>
+            <a:ext cx="541018" cy="1770458"/>
+          </a:xfrm>
+          <a:prstGeom prst="bentConnector3">
+            <a:avLst/>
+          </a:prstGeom>
+        </p:spPr>
+        <p:style>
+          <a:lnRef idx="1">
+            <a:schemeClr val="dk1"/>
+          </a:lnRef>
+          <a:fillRef idx="0">
+            <a:schemeClr val="dk1"/>
+          </a:fillRef>
+          <a:effectRef idx="0">
+            <a:schemeClr val="dk1"/>
+          </a:effectRef>
+          <a:fontRef idx="minor">
+            <a:schemeClr val="tx1"/>
+          </a:fontRef>
+        </p:style>
+      </p:cxnSp>
+      <p:cxnSp>
+        <p:nvCxnSpPr>
+          <p:cNvPr id="107" name="Connettore 4 106">
+            <a:extLst>
+              <a:ext uri="{FF2B5EF4-FFF2-40B4-BE49-F238E27FC236}">
+                <a16:creationId xmlns:a16="http://schemas.microsoft.com/office/drawing/2014/main" id="{02F2D0BF-1099-0F4E-8D0A-E22B9766BBB6}"/>
+              </a:ext>
+            </a:extLst>
+          </p:cNvPr>
+          <p:cNvCxnSpPr>
+            <a:stCxn id="103" idx="2"/>
+            <a:endCxn id="75" idx="0"/>
+          </p:cNvCxnSpPr>
+          <p:nvPr/>
+        </p:nvCxnSpPr>
+        <p:spPr>
+          <a:xfrm rot="16200000" flipH="1">
+            <a:off x="9138222" y="2311715"/>
+            <a:ext cx="541019" cy="1880391"/>
+          </a:xfrm>
+          <a:prstGeom prst="bentConnector3">
+            <a:avLst/>
+          </a:prstGeom>
+        </p:spPr>
+        <p:style>
+          <a:lnRef idx="1">
+            <a:schemeClr val="dk1"/>
+          </a:lnRef>
+          <a:fillRef idx="0">
+            <a:schemeClr val="dk1"/>
+          </a:fillRef>
+          <a:effectRef idx="0">
+            <a:schemeClr val="dk1"/>
+          </a:effectRef>
+          <a:fontRef idx="minor">
+            <a:schemeClr val="tx1"/>
+          </a:fontRef>
+        </p:style>
+      </p:cxnSp>
+      <p:sp>
+        <p:nvSpPr>
+          <p:cNvPr id="108" name="Rettangolo con angoli arrotondati 107">
+            <a:extLst>
+              <a:ext uri="{FF2B5EF4-FFF2-40B4-BE49-F238E27FC236}">
+                <a16:creationId xmlns:a16="http://schemas.microsoft.com/office/drawing/2014/main" id="{05191910-3605-514F-9C3E-A637B3850FD5}"/>
               </a:ext>
             </a:extLst>
           </p:cNvPr>
@@ -4698,8 +4826,8 @@
         </p:nvSpPr>
         <p:spPr>
           <a:xfrm>
-            <a:off x="9021348" y="4660816"/>
-            <a:ext cx="1130763" cy="552291"/>
+            <a:off x="10884195" y="2429110"/>
+            <a:ext cx="1476534" cy="552291"/>
           </a:xfrm>
           <a:prstGeom prst="roundRect">
             <a:avLst/>
@@ -4743,594 +4871,6 @@
                   <a:schemeClr val="tx1"/>
                 </a:solidFill>
               </a:rPr>
-              <a:t>3.2.1</a:t>
-            </a:r>
-          </a:p>
-          <a:p>
-            <a:pPr algn="ctr"/>
-            <a:r>
-              <a:rPr lang="en-GB" sz="1242" dirty="0">
-                <a:solidFill>
-                  <a:schemeClr val="tx1"/>
-                </a:solidFill>
-              </a:rPr>
-              <a:t>Default Sharing</a:t>
-            </a:r>
-          </a:p>
-        </p:txBody>
-      </p:sp>
-      <p:cxnSp>
-        <p:nvCxnSpPr>
-          <p:cNvPr id="66" name="Connettore 4 65">
-            <a:extLst>
-              <a:ext uri="{FF2B5EF4-FFF2-40B4-BE49-F238E27FC236}">
-                <a16:creationId xmlns:a16="http://schemas.microsoft.com/office/drawing/2014/main" id="{13EA4ADE-08E6-064A-B77B-1EF9498DA730}"/>
-              </a:ext>
-            </a:extLst>
-          </p:cNvPr>
-          <p:cNvCxnSpPr>
-            <a:stCxn id="64" idx="2"/>
-            <a:endCxn id="63" idx="0"/>
-          </p:cNvCxnSpPr>
-          <p:nvPr/>
-        </p:nvCxnSpPr>
-        <p:spPr>
-          <a:xfrm rot="16200000" flipH="1">
-            <a:off x="10430115" y="4369721"/>
-            <a:ext cx="502548" cy="2189319"/>
-          </a:xfrm>
-          <a:prstGeom prst="bentConnector3">
-            <a:avLst/>
-          </a:prstGeom>
-        </p:spPr>
-        <p:style>
-          <a:lnRef idx="1">
-            <a:schemeClr val="dk1"/>
-          </a:lnRef>
-          <a:fillRef idx="0">
-            <a:schemeClr val="dk1"/>
-          </a:fillRef>
-          <a:effectRef idx="0">
-            <a:schemeClr val="dk1"/>
-          </a:effectRef>
-          <a:fontRef idx="minor">
-            <a:schemeClr val="tx1"/>
-          </a:fontRef>
-        </p:style>
-      </p:cxnSp>
-      <p:cxnSp>
-        <p:nvCxnSpPr>
-          <p:cNvPr id="68" name="Connettore 4 67">
-            <a:extLst>
-              <a:ext uri="{FF2B5EF4-FFF2-40B4-BE49-F238E27FC236}">
-                <a16:creationId xmlns:a16="http://schemas.microsoft.com/office/drawing/2014/main" id="{4FBB0CA8-769A-914E-B2E1-4297180C33D8}"/>
-              </a:ext>
-            </a:extLst>
-          </p:cNvPr>
-          <p:cNvCxnSpPr>
-            <a:stCxn id="64" idx="2"/>
-            <a:endCxn id="61" idx="0"/>
-          </p:cNvCxnSpPr>
-          <p:nvPr/>
-        </p:nvCxnSpPr>
-        <p:spPr>
-          <a:xfrm rot="16200000" flipH="1">
-            <a:off x="9767529" y="5032308"/>
-            <a:ext cx="502549" cy="864146"/>
-          </a:xfrm>
-          <a:prstGeom prst="bentConnector3">
-            <a:avLst/>
-          </a:prstGeom>
-        </p:spPr>
-        <p:style>
-          <a:lnRef idx="1">
-            <a:schemeClr val="dk1"/>
-          </a:lnRef>
-          <a:fillRef idx="0">
-            <a:schemeClr val="dk1"/>
-          </a:fillRef>
-          <a:effectRef idx="0">
-            <a:schemeClr val="dk1"/>
-          </a:effectRef>
-          <a:fontRef idx="minor">
-            <a:schemeClr val="tx1"/>
-          </a:fontRef>
-        </p:style>
-      </p:cxnSp>
-      <p:cxnSp>
-        <p:nvCxnSpPr>
-          <p:cNvPr id="70" name="Connettore 4 69">
-            <a:extLst>
-              <a:ext uri="{FF2B5EF4-FFF2-40B4-BE49-F238E27FC236}">
-                <a16:creationId xmlns:a16="http://schemas.microsoft.com/office/drawing/2014/main" id="{3378B7C3-E06A-AE4A-87B9-E32BA57B21AC}"/>
-              </a:ext>
-            </a:extLst>
-          </p:cNvPr>
-          <p:cNvCxnSpPr>
-            <a:stCxn id="64" idx="2"/>
-            <a:endCxn id="60" idx="0"/>
-          </p:cNvCxnSpPr>
-          <p:nvPr/>
-        </p:nvCxnSpPr>
-        <p:spPr>
-          <a:xfrm rot="5400000">
-            <a:off x="9104943" y="5233868"/>
-            <a:ext cx="502548" cy="461027"/>
-          </a:xfrm>
-          <a:prstGeom prst="bentConnector3">
-            <a:avLst/>
-          </a:prstGeom>
-        </p:spPr>
-        <p:style>
-          <a:lnRef idx="1">
-            <a:schemeClr val="dk1"/>
-          </a:lnRef>
-          <a:fillRef idx="0">
-            <a:schemeClr val="dk1"/>
-          </a:fillRef>
-          <a:effectRef idx="0">
-            <a:schemeClr val="dk1"/>
-          </a:effectRef>
-          <a:fontRef idx="minor">
-            <a:schemeClr val="tx1"/>
-          </a:fontRef>
-        </p:style>
-      </p:cxnSp>
-      <p:sp>
-        <p:nvSpPr>
-          <p:cNvPr id="74" name="Rettangolo con angoli arrotondati 73">
-            <a:extLst>
-              <a:ext uri="{FF2B5EF4-FFF2-40B4-BE49-F238E27FC236}">
-                <a16:creationId xmlns:a16="http://schemas.microsoft.com/office/drawing/2014/main" id="{7D7BCCA1-BFFE-DD48-BBA4-0010CE39D9BD}"/>
-              </a:ext>
-            </a:extLst>
-          </p:cNvPr>
-          <p:cNvSpPr/>
-          <p:nvPr/>
-        </p:nvSpPr>
-        <p:spPr>
-          <a:xfrm>
-            <a:off x="10547795" y="4660816"/>
-            <a:ext cx="1130763" cy="552291"/>
-          </a:xfrm>
-          <a:prstGeom prst="roundRect">
-            <a:avLst/>
-          </a:prstGeom>
-          <a:noFill/>
-          <a:ln>
-            <a:solidFill>
-              <a:schemeClr val="tx1"/>
-            </a:solidFill>
-          </a:ln>
-        </p:spPr>
-        <p:style>
-          <a:lnRef idx="2">
-            <a:schemeClr val="accent1">
-              <a:shade val="50000"/>
-            </a:schemeClr>
-          </a:lnRef>
-          <a:fillRef idx="1">
-            <a:schemeClr val="accent1"/>
-          </a:fillRef>
-          <a:effectRef idx="0">
-            <a:schemeClr val="accent1"/>
-          </a:effectRef>
-          <a:fontRef idx="minor">
-            <a:schemeClr val="lt1"/>
-          </a:fontRef>
-        </p:style>
-        <p:txBody>
-          <a:bodyPr rot="0" spcFirstLastPara="0" vertOverflow="overflow" horzOverflow="overflow" vert="horz" wrap="square" lIns="94679" tIns="47339" rIns="94679" bIns="47339" numCol="1" spcCol="0" rtlCol="0" fromWordArt="0" anchor="ctr" anchorCtr="0" forceAA="0" compatLnSpc="1">
-            <a:prstTxWarp prst="textNoShape">
-              <a:avLst/>
-            </a:prstTxWarp>
-            <a:noAutofit/>
-          </a:bodyPr>
-          <a:lstStyle/>
-          <a:p>
-            <a:pPr algn="ctr"/>
-            <a:r>
-              <a:rPr lang="en-GB" sz="1242" dirty="0">
-                <a:solidFill>
-                  <a:schemeClr val="tx1"/>
-                </a:solidFill>
-              </a:rPr>
-              <a:t>3.2.2</a:t>
-            </a:r>
-          </a:p>
-          <a:p>
-            <a:pPr algn="ctr"/>
-            <a:r>
-              <a:rPr lang="en-GB" sz="1242" dirty="0">
-                <a:solidFill>
-                  <a:schemeClr val="tx1"/>
-                </a:solidFill>
-              </a:rPr>
-              <a:t>Write</a:t>
-            </a:r>
-          </a:p>
-          <a:p>
-            <a:pPr algn="ctr"/>
-            <a:r>
-              <a:rPr lang="en-GB" sz="1242" dirty="0">
-                <a:solidFill>
-                  <a:schemeClr val="tx1"/>
-                </a:solidFill>
-              </a:rPr>
-              <a:t>Address</a:t>
-            </a:r>
-          </a:p>
-        </p:txBody>
-      </p:sp>
-      <p:sp>
-        <p:nvSpPr>
-          <p:cNvPr id="75" name="Rettangolo con angoli arrotondati 74">
-            <a:extLst>
-              <a:ext uri="{FF2B5EF4-FFF2-40B4-BE49-F238E27FC236}">
-                <a16:creationId xmlns:a16="http://schemas.microsoft.com/office/drawing/2014/main" id="{28ABA5BC-4810-6044-A7E5-D919D393FFF8}"/>
-              </a:ext>
-            </a:extLst>
-          </p:cNvPr>
-          <p:cNvSpPr/>
-          <p:nvPr/>
-        </p:nvSpPr>
-        <p:spPr>
-          <a:xfrm>
-            <a:off x="9561308" y="3522421"/>
-            <a:ext cx="1575237" cy="552291"/>
-          </a:xfrm>
-          <a:prstGeom prst="roundRect">
-            <a:avLst/>
-          </a:prstGeom>
-          <a:noFill/>
-          <a:ln>
-            <a:solidFill>
-              <a:schemeClr val="tx1"/>
-            </a:solidFill>
-          </a:ln>
-        </p:spPr>
-        <p:style>
-          <a:lnRef idx="2">
-            <a:schemeClr val="accent1">
-              <a:shade val="50000"/>
-            </a:schemeClr>
-          </a:lnRef>
-          <a:fillRef idx="1">
-            <a:schemeClr val="accent1"/>
-          </a:fillRef>
-          <a:effectRef idx="0">
-            <a:schemeClr val="accent1"/>
-          </a:effectRef>
-          <a:fontRef idx="minor">
-            <a:schemeClr val="lt1"/>
-          </a:fontRef>
-        </p:style>
-        <p:txBody>
-          <a:bodyPr rot="0" spcFirstLastPara="0" vertOverflow="overflow" horzOverflow="overflow" vert="horz" wrap="square" lIns="94679" tIns="47339" rIns="94679" bIns="47339" numCol="1" spcCol="0" rtlCol="0" fromWordArt="0" anchor="ctr" anchorCtr="0" forceAA="0" compatLnSpc="1">
-            <a:prstTxWarp prst="textNoShape">
-              <a:avLst/>
-            </a:prstTxWarp>
-            <a:noAutofit/>
-          </a:bodyPr>
-          <a:lstStyle/>
-          <a:p>
-            <a:pPr algn="ctr"/>
-            <a:r>
-              <a:rPr lang="en-GB" sz="1242" dirty="0">
-                <a:solidFill>
-                  <a:schemeClr val="tx1"/>
-                </a:solidFill>
-              </a:rPr>
-              <a:t>3.2</a:t>
-            </a:r>
-          </a:p>
-          <a:p>
-            <a:pPr algn="ctr"/>
-            <a:r>
-              <a:rPr lang="en-GB" sz="1242" dirty="0">
-                <a:solidFill>
-                  <a:schemeClr val="tx1"/>
-                </a:solidFill>
-              </a:rPr>
-              <a:t>Add Position</a:t>
-            </a:r>
-          </a:p>
-        </p:txBody>
-      </p:sp>
-      <p:cxnSp>
-        <p:nvCxnSpPr>
-          <p:cNvPr id="91" name="Connettore 4 90">
-            <a:extLst>
-              <a:ext uri="{FF2B5EF4-FFF2-40B4-BE49-F238E27FC236}">
-                <a16:creationId xmlns:a16="http://schemas.microsoft.com/office/drawing/2014/main" id="{10A14FCB-50A6-674C-AB8A-F0F629B18AA3}"/>
-              </a:ext>
-            </a:extLst>
-          </p:cNvPr>
-          <p:cNvCxnSpPr>
-            <a:cxnSpLocks/>
-            <a:stCxn id="75" idx="2"/>
-            <a:endCxn id="64" idx="0"/>
-          </p:cNvCxnSpPr>
-          <p:nvPr/>
-        </p:nvCxnSpPr>
-        <p:spPr>
-          <a:xfrm rot="5400000">
-            <a:off x="9674777" y="3986666"/>
-            <a:ext cx="586104" cy="762197"/>
-          </a:xfrm>
-          <a:prstGeom prst="bentConnector3">
-            <a:avLst>
-              <a:gd name="adj1" fmla="val 50000"/>
-            </a:avLst>
-          </a:prstGeom>
-        </p:spPr>
-        <p:style>
-          <a:lnRef idx="1">
-            <a:schemeClr val="dk1"/>
-          </a:lnRef>
-          <a:fillRef idx="0">
-            <a:schemeClr val="dk1"/>
-          </a:fillRef>
-          <a:effectRef idx="0">
-            <a:schemeClr val="dk1"/>
-          </a:effectRef>
-          <a:fontRef idx="minor">
-            <a:schemeClr val="tx1"/>
-          </a:fontRef>
-        </p:style>
-      </p:cxnSp>
-      <p:cxnSp>
-        <p:nvCxnSpPr>
-          <p:cNvPr id="94" name="Connettore 4 93">
-            <a:extLst>
-              <a:ext uri="{FF2B5EF4-FFF2-40B4-BE49-F238E27FC236}">
-                <a16:creationId xmlns:a16="http://schemas.microsoft.com/office/drawing/2014/main" id="{6372FE11-3526-564F-A93E-290DF6574A73}"/>
-              </a:ext>
-            </a:extLst>
-          </p:cNvPr>
-          <p:cNvCxnSpPr>
-            <a:cxnSpLocks/>
-            <a:stCxn id="75" idx="2"/>
-            <a:endCxn id="74" idx="0"/>
-          </p:cNvCxnSpPr>
-          <p:nvPr/>
-        </p:nvCxnSpPr>
-        <p:spPr>
-          <a:xfrm rot="16200000" flipH="1">
-            <a:off x="10438000" y="3985639"/>
-            <a:ext cx="586104" cy="764250"/>
-          </a:xfrm>
-          <a:prstGeom prst="bentConnector3">
-            <a:avLst/>
-          </a:prstGeom>
-        </p:spPr>
-        <p:style>
-          <a:lnRef idx="1">
-            <a:schemeClr val="dk1"/>
-          </a:lnRef>
-          <a:fillRef idx="0">
-            <a:schemeClr val="dk1"/>
-          </a:fillRef>
-          <a:effectRef idx="0">
-            <a:schemeClr val="dk1"/>
-          </a:effectRef>
-          <a:fontRef idx="minor">
-            <a:schemeClr val="tx1"/>
-          </a:fontRef>
-        </p:style>
-      </p:cxnSp>
-      <p:sp>
-        <p:nvSpPr>
-          <p:cNvPr id="103" name="Rettangolo con angoli arrotondati 102">
-            <a:extLst>
-              <a:ext uri="{FF2B5EF4-FFF2-40B4-BE49-F238E27FC236}">
-                <a16:creationId xmlns:a16="http://schemas.microsoft.com/office/drawing/2014/main" id="{550FD913-98C2-7B46-98CA-ACB4EE23C37E}"/>
-              </a:ext>
-            </a:extLst>
-          </p:cNvPr>
-          <p:cNvSpPr/>
-          <p:nvPr/>
-        </p:nvSpPr>
-        <p:spPr>
-          <a:xfrm>
-            <a:off x="7730269" y="2429111"/>
-            <a:ext cx="1476534" cy="552291"/>
-          </a:xfrm>
-          <a:prstGeom prst="roundRect">
-            <a:avLst/>
-          </a:prstGeom>
-          <a:noFill/>
-          <a:ln>
-            <a:solidFill>
-              <a:schemeClr val="tx1"/>
-            </a:solidFill>
-          </a:ln>
-        </p:spPr>
-        <p:style>
-          <a:lnRef idx="2">
-            <a:schemeClr val="accent1">
-              <a:shade val="50000"/>
-            </a:schemeClr>
-          </a:lnRef>
-          <a:fillRef idx="1">
-            <a:schemeClr val="accent1"/>
-          </a:fillRef>
-          <a:effectRef idx="0">
-            <a:schemeClr val="accent1"/>
-          </a:effectRef>
-          <a:fontRef idx="minor">
-            <a:schemeClr val="lt1"/>
-          </a:fontRef>
-        </p:style>
-        <p:txBody>
-          <a:bodyPr rot="0" spcFirstLastPara="0" vertOverflow="overflow" horzOverflow="overflow" vert="horz" wrap="square" lIns="94679" tIns="47339" rIns="94679" bIns="47339" numCol="1" spcCol="0" rtlCol="0" fromWordArt="0" anchor="ctr" anchorCtr="0" forceAA="0" compatLnSpc="1">
-            <a:prstTxWarp prst="textNoShape">
-              <a:avLst/>
-            </a:prstTxWarp>
-            <a:noAutofit/>
-          </a:bodyPr>
-          <a:lstStyle/>
-          <a:p>
-            <a:pPr algn="ctr"/>
-            <a:r>
-              <a:rPr lang="en-GB" sz="1242" dirty="0">
-                <a:solidFill>
-                  <a:schemeClr val="tx1"/>
-                </a:solidFill>
-              </a:rPr>
-              <a:t>3. </a:t>
-            </a:r>
-          </a:p>
-          <a:p>
-            <a:pPr algn="ctr"/>
-            <a:r>
-              <a:rPr lang="en-GB" sz="1242" dirty="0">
-                <a:solidFill>
-                  <a:schemeClr val="tx1"/>
-                </a:solidFill>
-              </a:rPr>
-              <a:t>Insert Shop Data</a:t>
-            </a:r>
-          </a:p>
-        </p:txBody>
-      </p:sp>
-      <p:cxnSp>
-        <p:nvCxnSpPr>
-          <p:cNvPr id="105" name="Connettore 4 104">
-            <a:extLst>
-              <a:ext uri="{FF2B5EF4-FFF2-40B4-BE49-F238E27FC236}">
-                <a16:creationId xmlns:a16="http://schemas.microsoft.com/office/drawing/2014/main" id="{BEFE228F-8612-F542-8055-451E7961F785}"/>
-              </a:ext>
-            </a:extLst>
-          </p:cNvPr>
-          <p:cNvCxnSpPr>
-            <a:stCxn id="103" idx="2"/>
-            <a:endCxn id="55" idx="0"/>
-          </p:cNvCxnSpPr>
-          <p:nvPr/>
-        </p:nvCxnSpPr>
-        <p:spPr>
-          <a:xfrm rot="5400000">
-            <a:off x="7312798" y="2366682"/>
-            <a:ext cx="541018" cy="1770458"/>
-          </a:xfrm>
-          <a:prstGeom prst="bentConnector3">
-            <a:avLst/>
-          </a:prstGeom>
-        </p:spPr>
-        <p:style>
-          <a:lnRef idx="1">
-            <a:schemeClr val="dk1"/>
-          </a:lnRef>
-          <a:fillRef idx="0">
-            <a:schemeClr val="dk1"/>
-          </a:fillRef>
-          <a:effectRef idx="0">
-            <a:schemeClr val="dk1"/>
-          </a:effectRef>
-          <a:fontRef idx="minor">
-            <a:schemeClr val="tx1"/>
-          </a:fontRef>
-        </p:style>
-      </p:cxnSp>
-      <p:cxnSp>
-        <p:nvCxnSpPr>
-          <p:cNvPr id="107" name="Connettore 4 106">
-            <a:extLst>
-              <a:ext uri="{FF2B5EF4-FFF2-40B4-BE49-F238E27FC236}">
-                <a16:creationId xmlns:a16="http://schemas.microsoft.com/office/drawing/2014/main" id="{02F2D0BF-1099-0F4E-8D0A-E22B9766BBB6}"/>
-              </a:ext>
-            </a:extLst>
-          </p:cNvPr>
-          <p:cNvCxnSpPr>
-            <a:stCxn id="103" idx="2"/>
-            <a:endCxn id="75" idx="0"/>
-          </p:cNvCxnSpPr>
-          <p:nvPr/>
-        </p:nvCxnSpPr>
-        <p:spPr>
-          <a:xfrm rot="16200000" flipH="1">
-            <a:off x="9138222" y="2311715"/>
-            <a:ext cx="541019" cy="1880391"/>
-          </a:xfrm>
-          <a:prstGeom prst="bentConnector3">
-            <a:avLst/>
-          </a:prstGeom>
-        </p:spPr>
-        <p:style>
-          <a:lnRef idx="1">
-            <a:schemeClr val="dk1"/>
-          </a:lnRef>
-          <a:fillRef idx="0">
-            <a:schemeClr val="dk1"/>
-          </a:fillRef>
-          <a:effectRef idx="0">
-            <a:schemeClr val="dk1"/>
-          </a:effectRef>
-          <a:fontRef idx="minor">
-            <a:schemeClr val="tx1"/>
-          </a:fontRef>
-        </p:style>
-      </p:cxnSp>
-      <p:sp>
-        <p:nvSpPr>
-          <p:cNvPr id="108" name="Rettangolo con angoli arrotondati 107">
-            <a:extLst>
-              <a:ext uri="{FF2B5EF4-FFF2-40B4-BE49-F238E27FC236}">
-                <a16:creationId xmlns:a16="http://schemas.microsoft.com/office/drawing/2014/main" id="{05191910-3605-514F-9C3E-A637B3850FD5}"/>
-              </a:ext>
-            </a:extLst>
-          </p:cNvPr>
-          <p:cNvSpPr/>
-          <p:nvPr/>
-        </p:nvSpPr>
-        <p:spPr>
-          <a:xfrm>
-            <a:off x="10884195" y="2429110"/>
-            <a:ext cx="1476534" cy="552291"/>
-          </a:xfrm>
-          <a:prstGeom prst="roundRect">
-            <a:avLst/>
-          </a:prstGeom>
-          <a:noFill/>
-          <a:ln>
-            <a:solidFill>
-              <a:schemeClr val="tx1"/>
-            </a:solidFill>
-          </a:ln>
-        </p:spPr>
-        <p:style>
-          <a:lnRef idx="2">
-            <a:schemeClr val="accent1">
-              <a:shade val="50000"/>
-            </a:schemeClr>
-          </a:lnRef>
-          <a:fillRef idx="1">
-            <a:schemeClr val="accent1"/>
-          </a:fillRef>
-          <a:effectRef idx="0">
-            <a:schemeClr val="accent1"/>
-          </a:effectRef>
-          <a:fontRef idx="minor">
-            <a:schemeClr val="lt1"/>
-          </a:fontRef>
-        </p:style>
-        <p:txBody>
-          <a:bodyPr rot="0" spcFirstLastPara="0" vertOverflow="overflow" horzOverflow="overflow" vert="horz" wrap="square" lIns="94679" tIns="47339" rIns="94679" bIns="47339" numCol="1" spcCol="0" rtlCol="0" fromWordArt="0" anchor="ctr" anchorCtr="0" forceAA="0" compatLnSpc="1">
-            <a:prstTxWarp prst="textNoShape">
-              <a:avLst/>
-            </a:prstTxWarp>
-            <a:noAutofit/>
-          </a:bodyPr>
-          <a:lstStyle/>
-          <a:p>
-            <a:pPr algn="ctr"/>
-            <a:r>
-              <a:rPr lang="en-GB" sz="1242" dirty="0">
-                <a:solidFill>
-                  <a:schemeClr val="tx1"/>
-                </a:solidFill>
-              </a:rPr>
               <a:t>4. </a:t>
             </a:r>
           </a:p>
@@ -5518,7 +5058,7 @@
         <p:spPr>
           <a:xfrm>
             <a:off x="6470346" y="1859058"/>
-            <a:ext cx="2192716" cy="276999"/>
+            <a:ext cx="1495922" cy="215444"/>
           </a:xfrm>
           <a:prstGeom prst="rect">
             <a:avLst/>
@@ -5531,14 +5071,14 @@
           <a:lstStyle/>
           <a:p>
             <a:r>
-              <a:rPr lang="en-GB" sz="1200" u="sng" dirty="0"/>
+              <a:rPr lang="en-GB" sz="800" u="sng" dirty="0"/>
               <a:t>Plan 0</a:t>
             </a:r>
             <a:r>
-              <a:rPr lang="en-GB" sz="1200" dirty="0"/>
-              <a:t>: 1 – 2 – 3 – 4 in this order</a:t>
-            </a:r>
-            <a:endParaRPr lang="it-IT" sz="1200" dirty="0"/>
+              <a:rPr lang="en-GB" sz="800" dirty="0"/>
+              <a:t>: 1 – if necessary 2 – 3 – 4</a:t>
+            </a:r>
+            <a:endParaRPr lang="it-IT" sz="800" dirty="0"/>
           </a:p>
         </p:txBody>
       </p:sp>
@@ -5556,8 +5096,8 @@
         </p:nvSpPr>
         <p:spPr>
           <a:xfrm>
-            <a:off x="413764" y="2829925"/>
-            <a:ext cx="1726242" cy="461665"/>
+            <a:off x="1689771" y="3065114"/>
+            <a:ext cx="1510350" cy="215444"/>
           </a:xfrm>
           <a:prstGeom prst="rect">
             <a:avLst/>
@@ -5570,20 +5110,14 @@
           <a:lstStyle/>
           <a:p>
             <a:r>
-              <a:rPr lang="en-GB" sz="1200" u="sng" dirty="0"/>
+              <a:rPr lang="en-GB" sz="800" u="sng" dirty="0"/>
               <a:t>Plan 1</a:t>
             </a:r>
             <a:r>
-              <a:rPr lang="en-GB" sz="1200" dirty="0"/>
-              <a:t>:</a:t>
-            </a:r>
-          </a:p>
-          <a:p>
-            <a:r>
-              <a:rPr lang="en-GB" sz="1200" dirty="0"/>
-              <a:t>Do 1.1 – 1.2 in this order</a:t>
-            </a:r>
-            <a:endParaRPr lang="it-IT" sz="1200" dirty="0"/>
+              <a:rPr lang="en-GB" sz="800" dirty="0"/>
+              <a:t>: Do 1.1 – 1.2 in this order</a:t>
+            </a:r>
+            <a:endParaRPr lang="it-IT" sz="800" dirty="0"/>
           </a:p>
         </p:txBody>
       </p:sp>
@@ -5601,8 +5135,8 @@
         </p:nvSpPr>
         <p:spPr>
           <a:xfrm>
-            <a:off x="593276" y="4073861"/>
-            <a:ext cx="1960280" cy="553998"/>
+            <a:off x="981461" y="4191131"/>
+            <a:ext cx="1741182" cy="215444"/>
           </a:xfrm>
           <a:prstGeom prst="rect">
             <a:avLst/>
@@ -5615,32 +5149,23 @@
           <a:lstStyle/>
           <a:p>
             <a:r>
-              <a:rPr lang="en-GB" sz="1200" u="sng" dirty="0"/>
+              <a:rPr lang="en-GB" sz="800" u="sng" dirty="0"/>
               <a:t>Plan 1.1</a:t>
             </a:r>
             <a:r>
-              <a:rPr lang="en-GB" sz="1200" dirty="0"/>
-              <a:t>:</a:t>
-            </a:r>
-          </a:p>
-          <a:p>
-            <a:endParaRPr lang="en-GB" sz="600" dirty="0"/>
-          </a:p>
-          <a:p>
-            <a:r>
-              <a:rPr lang="en-GB" sz="1200" dirty="0"/>
-              <a:t>Do 1.1.1 – 1.1.2 in this order</a:t>
-            </a:r>
-            <a:endParaRPr lang="it-IT" sz="1200" dirty="0"/>
-          </a:p>
-        </p:txBody>
-      </p:sp>
-      <p:sp>
-        <p:nvSpPr>
-          <p:cNvPr id="127" name="Rettangolo 126">
-            <a:extLst>
-              <a:ext uri="{FF2B5EF4-FFF2-40B4-BE49-F238E27FC236}">
-                <a16:creationId xmlns:a16="http://schemas.microsoft.com/office/drawing/2014/main" id="{9942B2E0-0FD4-5242-B7FD-8BFB9F6A948F}"/>
+              <a:rPr lang="en-GB" sz="800" dirty="0"/>
+              <a:t>: Do 1.1.1 – 1.1.2 in this order</a:t>
+            </a:r>
+            <a:endParaRPr lang="it-IT" sz="800" dirty="0"/>
+          </a:p>
+        </p:txBody>
+      </p:sp>
+      <p:sp>
+        <p:nvSpPr>
+          <p:cNvPr id="129" name="Rettangolo 128">
+            <a:extLst>
+              <a:ext uri="{FF2B5EF4-FFF2-40B4-BE49-F238E27FC236}">
+                <a16:creationId xmlns:a16="http://schemas.microsoft.com/office/drawing/2014/main" id="{D9D77742-BEA6-1344-AE55-D99C999BF9BA}"/>
               </a:ext>
             </a:extLst>
           </p:cNvPr>
@@ -5649,8 +5174,8 @@
         </p:nvSpPr>
         <p:spPr>
           <a:xfrm>
-            <a:off x="3146433" y="3021508"/>
-            <a:ext cx="1452642" cy="276999"/>
+            <a:off x="6724946" y="3069581"/>
+            <a:ext cx="1531188" cy="215444"/>
           </a:xfrm>
           <a:prstGeom prst="rect">
             <a:avLst/>
@@ -5663,23 +5188,23 @@
           <a:lstStyle/>
           <a:p>
             <a:r>
-              <a:rPr lang="en-GB" sz="1200" u="sng" dirty="0"/>
-              <a:t>Plan 2</a:t>
-            </a:r>
-            <a:r>
-              <a:rPr lang="en-GB" sz="1200" dirty="0"/>
-              <a:t>: Do 2.1 or 2.2</a:t>
-            </a:r>
-            <a:endParaRPr lang="it-IT" sz="1200" dirty="0"/>
-          </a:p>
-        </p:txBody>
-      </p:sp>
-      <p:sp>
-        <p:nvSpPr>
-          <p:cNvPr id="129" name="Rettangolo 128">
-            <a:extLst>
-              <a:ext uri="{FF2B5EF4-FFF2-40B4-BE49-F238E27FC236}">
-                <a16:creationId xmlns:a16="http://schemas.microsoft.com/office/drawing/2014/main" id="{D9D77742-BEA6-1344-AE55-D99C999BF9BA}"/>
+              <a:rPr lang="en-GB" sz="800" u="sng" dirty="0"/>
+              <a:t>Plan 3</a:t>
+            </a:r>
+            <a:r>
+              <a:rPr lang="en-GB" sz="800" dirty="0"/>
+              <a:t>: Do 3.1 – 3.2 in any order </a:t>
+            </a:r>
+            <a:endParaRPr lang="it-IT" sz="800" dirty="0"/>
+          </a:p>
+        </p:txBody>
+      </p:sp>
+      <p:sp>
+        <p:nvSpPr>
+          <p:cNvPr id="130" name="Rettangolo 129">
+            <a:extLst>
+              <a:ext uri="{FF2B5EF4-FFF2-40B4-BE49-F238E27FC236}">
+                <a16:creationId xmlns:a16="http://schemas.microsoft.com/office/drawing/2014/main" id="{68FA89C1-DA14-0044-B39A-DE3066CCFC2C}"/>
               </a:ext>
             </a:extLst>
           </p:cNvPr>
@@ -5688,8 +5213,8 @@
         </p:nvSpPr>
         <p:spPr>
           <a:xfrm>
-            <a:off x="6323397" y="2817449"/>
-            <a:ext cx="1753813" cy="461665"/>
+            <a:off x="5579364" y="4198156"/>
+            <a:ext cx="1763624" cy="215444"/>
           </a:xfrm>
           <a:prstGeom prst="rect">
             <a:avLst/>
@@ -5702,29 +5227,23 @@
           <a:lstStyle/>
           <a:p>
             <a:r>
-              <a:rPr lang="en-GB" sz="1200" u="sng" dirty="0"/>
-              <a:t>Plan 3</a:t>
-            </a:r>
-            <a:r>
-              <a:rPr lang="en-GB" sz="1200" dirty="0"/>
-              <a:t>: </a:t>
-            </a:r>
-          </a:p>
-          <a:p>
-            <a:r>
-              <a:rPr lang="en-GB" sz="1200" dirty="0"/>
-              <a:t>Do 3.1 – 3.2 in any order </a:t>
-            </a:r>
-            <a:endParaRPr lang="it-IT" sz="1200" dirty="0"/>
-          </a:p>
-        </p:txBody>
-      </p:sp>
-      <p:sp>
-        <p:nvSpPr>
-          <p:cNvPr id="130" name="Rettangolo 129">
-            <a:extLst>
-              <a:ext uri="{FF2B5EF4-FFF2-40B4-BE49-F238E27FC236}">
-                <a16:creationId xmlns:a16="http://schemas.microsoft.com/office/drawing/2014/main" id="{68FA89C1-DA14-0044-B39A-DE3066CCFC2C}"/>
+              <a:rPr lang="en-GB" sz="800" u="sng" dirty="0"/>
+              <a:t>Plan 3.1</a:t>
+            </a:r>
+            <a:r>
+              <a:rPr lang="en-GB" sz="800" dirty="0"/>
+              <a:t>: Do 3.1.1 – 3.1.2 in this order </a:t>
+            </a:r>
+            <a:endParaRPr lang="it-IT" sz="800" dirty="0"/>
+          </a:p>
+        </p:txBody>
+      </p:sp>
+      <p:sp>
+        <p:nvSpPr>
+          <p:cNvPr id="134" name="Rettangolo 133">
+            <a:extLst>
+              <a:ext uri="{FF2B5EF4-FFF2-40B4-BE49-F238E27FC236}">
+                <a16:creationId xmlns:a16="http://schemas.microsoft.com/office/drawing/2014/main" id="{BA52F642-CE06-6B4C-95C7-0869EF28E15B}"/>
               </a:ext>
             </a:extLst>
           </p:cNvPr>
@@ -5733,8 +5252,8 @@
         </p:nvSpPr>
         <p:spPr>
           <a:xfrm>
-            <a:off x="5513688" y="4112004"/>
-            <a:ext cx="1995546" cy="538609"/>
+            <a:off x="9053045" y="5285852"/>
+            <a:ext cx="2372765" cy="215444"/>
           </a:xfrm>
           <a:prstGeom prst="rect">
             <a:avLst/>
@@ -5747,32 +5266,23 @@
           <a:lstStyle/>
           <a:p>
             <a:r>
-              <a:rPr lang="en-GB" sz="1200" u="sng" dirty="0"/>
-              <a:t>Plan 3.1</a:t>
-            </a:r>
-            <a:r>
-              <a:rPr lang="en-GB" sz="1200" dirty="0"/>
-              <a:t>: </a:t>
-            </a:r>
-          </a:p>
-          <a:p>
-            <a:endParaRPr lang="en-GB" sz="500" dirty="0"/>
-          </a:p>
-          <a:p>
-            <a:r>
-              <a:rPr lang="en-GB" sz="1200" dirty="0"/>
-              <a:t>Do 3.1.1 – 3.1.2 in this order </a:t>
-            </a:r>
-            <a:endParaRPr lang="it-IT" sz="1200" dirty="0"/>
-          </a:p>
-        </p:txBody>
-      </p:sp>
-      <p:sp>
-        <p:nvSpPr>
-          <p:cNvPr id="132" name="Rettangolo 131">
-            <a:extLst>
-              <a:ext uri="{FF2B5EF4-FFF2-40B4-BE49-F238E27FC236}">
-                <a16:creationId xmlns:a16="http://schemas.microsoft.com/office/drawing/2014/main" id="{F69B0413-7225-DC4C-A931-E6A1CA6F8CC9}"/>
+              <a:rPr lang="en-GB" sz="800" u="sng" dirty="0"/>
+              <a:t>Plan 3.2.1</a:t>
+            </a:r>
+            <a:r>
+              <a:rPr lang="en-GB" sz="800" dirty="0"/>
+              <a:t>:  Do 3.2.1.1 – 3.2.1.2 – 3.2.1.3 in this order</a:t>
+            </a:r>
+            <a:endParaRPr lang="it-IT" sz="800" dirty="0"/>
+          </a:p>
+        </p:txBody>
+      </p:sp>
+      <p:sp>
+        <p:nvSpPr>
+          <p:cNvPr id="135" name="Rettangolo 134">
+            <a:extLst>
+              <a:ext uri="{FF2B5EF4-FFF2-40B4-BE49-F238E27FC236}">
+                <a16:creationId xmlns:a16="http://schemas.microsoft.com/office/drawing/2014/main" id="{4F721C49-06E1-D042-B3C8-52787227B03F}"/>
               </a:ext>
             </a:extLst>
           </p:cNvPr>
@@ -5781,8 +5291,8 @@
         </p:nvSpPr>
         <p:spPr>
           <a:xfrm>
-            <a:off x="5689654" y="5437374"/>
-            <a:ext cx="2190023" cy="276999"/>
+            <a:off x="9502595" y="4192541"/>
+            <a:ext cx="1854995" cy="215444"/>
           </a:xfrm>
           <a:prstGeom prst="rect">
             <a:avLst/>
@@ -5795,101 +5305,14 @@
           <a:lstStyle/>
           <a:p>
             <a:r>
-              <a:rPr lang="en-GB" sz="1200" u="sng" dirty="0"/>
-              <a:t>Plan 3.1.2</a:t>
-            </a:r>
-            <a:r>
-              <a:rPr lang="en-GB" sz="1200" dirty="0"/>
-              <a:t>: Do 3.1.2.1 or 3.1.2.2</a:t>
-            </a:r>
-            <a:endParaRPr lang="it-IT" sz="1200" dirty="0"/>
-          </a:p>
-        </p:txBody>
-      </p:sp>
-      <p:sp>
-        <p:nvSpPr>
-          <p:cNvPr id="134" name="Rettangolo 133">
-            <a:extLst>
-              <a:ext uri="{FF2B5EF4-FFF2-40B4-BE49-F238E27FC236}">
-                <a16:creationId xmlns:a16="http://schemas.microsoft.com/office/drawing/2014/main" id="{BA52F642-CE06-6B4C-95C7-0869EF28E15B}"/>
-              </a:ext>
-            </a:extLst>
-          </p:cNvPr>
-          <p:cNvSpPr/>
-          <p:nvPr/>
-        </p:nvSpPr>
-        <p:spPr>
-          <a:xfrm>
-            <a:off x="8815045" y="5213105"/>
-            <a:ext cx="3500767" cy="276999"/>
-          </a:xfrm>
-          <a:prstGeom prst="rect">
-            <a:avLst/>
-          </a:prstGeom>
-        </p:spPr>
-        <p:txBody>
-          <a:bodyPr wrap="none">
-            <a:spAutoFit/>
-          </a:bodyPr>
-          <a:lstStyle/>
-          <a:p>
-            <a:r>
-              <a:rPr lang="en-GB" sz="1200" u="sng" dirty="0"/>
-              <a:t>Plan 3.2.1</a:t>
-            </a:r>
-            <a:r>
-              <a:rPr lang="en-GB" sz="1200" dirty="0"/>
-              <a:t>:  Do 3.2.1.1 – 3.2.1.2 – 3.2.1.3 in this order</a:t>
-            </a:r>
-            <a:endParaRPr lang="it-IT" sz="1200" dirty="0"/>
-          </a:p>
-        </p:txBody>
-      </p:sp>
-      <p:sp>
-        <p:nvSpPr>
-          <p:cNvPr id="135" name="Rettangolo 134">
-            <a:extLst>
-              <a:ext uri="{FF2B5EF4-FFF2-40B4-BE49-F238E27FC236}">
-                <a16:creationId xmlns:a16="http://schemas.microsoft.com/office/drawing/2014/main" id="{4F721C49-06E1-D042-B3C8-52787227B03F}"/>
-              </a:ext>
-            </a:extLst>
-          </p:cNvPr>
-          <p:cNvSpPr/>
-          <p:nvPr/>
-        </p:nvSpPr>
-        <p:spPr>
-          <a:xfrm>
-            <a:off x="9517665" y="4098458"/>
-            <a:ext cx="1226618" cy="538609"/>
-          </a:xfrm>
-          <a:prstGeom prst="rect">
-            <a:avLst/>
-          </a:prstGeom>
-        </p:spPr>
-        <p:txBody>
-          <a:bodyPr wrap="none">
-            <a:spAutoFit/>
-          </a:bodyPr>
-          <a:lstStyle/>
-          <a:p>
-            <a:r>
-              <a:rPr lang="en-GB" sz="1200" u="sng" dirty="0"/>
+              <a:rPr lang="en-GB" sz="800" u="sng" dirty="0"/>
               <a:t>Plan 3.2</a:t>
             </a:r>
             <a:r>
-              <a:rPr lang="en-GB" sz="1200" dirty="0"/>
-              <a:t>: </a:t>
-            </a:r>
-          </a:p>
-          <a:p>
-            <a:endParaRPr lang="en-GB" sz="500" dirty="0"/>
-          </a:p>
-          <a:p>
-            <a:r>
-              <a:rPr lang="en-GB" sz="1200" dirty="0"/>
-              <a:t>Do 3.2.1 or 3.2.2</a:t>
-            </a:r>
-            <a:endParaRPr lang="it-IT" sz="1200" dirty="0"/>
+              <a:rPr lang="en-GB" sz="800" dirty="0"/>
+              <a:t>:  Do 3.2.1, if it failure then 3.2.2</a:t>
+            </a:r>
+            <a:endParaRPr lang="it-IT" sz="800" dirty="0"/>
           </a:p>
         </p:txBody>
       </p:sp>

</xml_diff>